<commit_message>
renamed some files to make VS intelisence friendly
</commit_message>
<xml_diff>
--- a/docs/using_matlabdev_repository.pptx
+++ b/docs/using_matlabdev_repository.pptx
@@ -291,7 +291,7 @@
           <a:p>
             <a:fld id="{B952F97B-CC46-424B-BEFC-AEEA73671E8D}" type="datetimeFigureOut">
               <a:rPr lang="de-DE" smtClean="0"/>
-              <a:t>09.04.2020</a:t>
+              <a:t>14.04.2020</a:t>
             </a:fld>
             <a:endParaRPr lang="de-DE"/>
           </a:p>
@@ -461,7 +461,7 @@
           <a:p>
             <a:fld id="{B952F97B-CC46-424B-BEFC-AEEA73671E8D}" type="datetimeFigureOut">
               <a:rPr lang="de-DE" smtClean="0"/>
-              <a:t>09.04.2020</a:t>
+              <a:t>14.04.2020</a:t>
             </a:fld>
             <a:endParaRPr lang="de-DE"/>
           </a:p>
@@ -641,7 +641,7 @@
           <a:p>
             <a:fld id="{B952F97B-CC46-424B-BEFC-AEEA73671E8D}" type="datetimeFigureOut">
               <a:rPr lang="de-DE" smtClean="0"/>
-              <a:t>09.04.2020</a:t>
+              <a:t>14.04.2020</a:t>
             </a:fld>
             <a:endParaRPr lang="de-DE"/>
           </a:p>
@@ -811,7 +811,7 @@
           <a:p>
             <a:fld id="{B952F97B-CC46-424B-BEFC-AEEA73671E8D}" type="datetimeFigureOut">
               <a:rPr lang="de-DE" smtClean="0"/>
-              <a:t>09.04.2020</a:t>
+              <a:t>14.04.2020</a:t>
             </a:fld>
             <a:endParaRPr lang="de-DE"/>
           </a:p>
@@ -1057,7 +1057,7 @@
           <a:p>
             <a:fld id="{B952F97B-CC46-424B-BEFC-AEEA73671E8D}" type="datetimeFigureOut">
               <a:rPr lang="de-DE" smtClean="0"/>
-              <a:t>09.04.2020</a:t>
+              <a:t>14.04.2020</a:t>
             </a:fld>
             <a:endParaRPr lang="de-DE"/>
           </a:p>
@@ -1345,7 +1345,7 @@
           <a:p>
             <a:fld id="{B952F97B-CC46-424B-BEFC-AEEA73671E8D}" type="datetimeFigureOut">
               <a:rPr lang="de-DE" smtClean="0"/>
-              <a:t>09.04.2020</a:t>
+              <a:t>14.04.2020</a:t>
             </a:fld>
             <a:endParaRPr lang="de-DE"/>
           </a:p>
@@ -1767,7 +1767,7 @@
           <a:p>
             <a:fld id="{B952F97B-CC46-424B-BEFC-AEEA73671E8D}" type="datetimeFigureOut">
               <a:rPr lang="de-DE" smtClean="0"/>
-              <a:t>09.04.2020</a:t>
+              <a:t>14.04.2020</a:t>
             </a:fld>
             <a:endParaRPr lang="de-DE"/>
           </a:p>
@@ -1885,7 +1885,7 @@
           <a:p>
             <a:fld id="{B952F97B-CC46-424B-BEFC-AEEA73671E8D}" type="datetimeFigureOut">
               <a:rPr lang="de-DE" smtClean="0"/>
-              <a:t>09.04.2020</a:t>
+              <a:t>14.04.2020</a:t>
             </a:fld>
             <a:endParaRPr lang="de-DE"/>
           </a:p>
@@ -1980,7 +1980,7 @@
           <a:p>
             <a:fld id="{B952F97B-CC46-424B-BEFC-AEEA73671E8D}" type="datetimeFigureOut">
               <a:rPr lang="de-DE" smtClean="0"/>
-              <a:t>09.04.2020</a:t>
+              <a:t>14.04.2020</a:t>
             </a:fld>
             <a:endParaRPr lang="de-DE"/>
           </a:p>
@@ -2257,7 +2257,7 @@
           <a:p>
             <a:fld id="{B952F97B-CC46-424B-BEFC-AEEA73671E8D}" type="datetimeFigureOut">
               <a:rPr lang="de-DE" smtClean="0"/>
-              <a:t>09.04.2020</a:t>
+              <a:t>14.04.2020</a:t>
             </a:fld>
             <a:endParaRPr lang="de-DE"/>
           </a:p>
@@ -2510,7 +2510,7 @@
           <a:p>
             <a:fld id="{B952F97B-CC46-424B-BEFC-AEEA73671E8D}" type="datetimeFigureOut">
               <a:rPr lang="de-DE" smtClean="0"/>
-              <a:t>09.04.2020</a:t>
+              <a:t>14.04.2020</a:t>
             </a:fld>
             <a:endParaRPr lang="de-DE"/>
           </a:p>
@@ -2723,7 +2723,7 @@
           <a:p>
             <a:fld id="{B952F97B-CC46-424B-BEFC-AEEA73671E8D}" type="datetimeFigureOut">
               <a:rPr lang="de-DE" smtClean="0"/>
-              <a:t>09.04.2020</a:t>
+              <a:t>14.04.2020</a:t>
             </a:fld>
             <a:endParaRPr lang="de-DE"/>
           </a:p>
@@ -3502,7 +3502,68 @@
           <a:bodyPr/>
           <a:lstStyle/>
           <a:p>
-            <a:endParaRPr lang="de-DE"/>
+            <a:r>
+              <a:rPr lang="en-US" dirty="0" smtClean="0"/>
+              <a:t>Define variable ‘</a:t>
+            </a:r>
+            <a:r>
+              <a:rPr lang="en-US" dirty="0" err="1" smtClean="0"/>
+              <a:t>MatlabDevRoot</a:t>
+            </a:r>
+            <a:r>
+              <a:rPr lang="en-US" dirty="0" smtClean="0"/>
+              <a:t>’</a:t>
+            </a:r>
+          </a:p>
+          <a:p>
+            <a:r>
+              <a:rPr lang="en-US" dirty="0" smtClean="0"/>
+              <a:t>Then include ‘</a:t>
+            </a:r>
+            <a:r>
+              <a:rPr lang="en-US" dirty="0" err="1" smtClean="0"/>
+              <a:t>prj</a:t>
+            </a:r>
+            <a:r>
+              <a:rPr lang="en-US" dirty="0" smtClean="0"/>
+              <a:t>/common/</a:t>
+            </a:r>
+            <a:r>
+              <a:rPr lang="en-US" dirty="0" err="1" smtClean="0"/>
+              <a:t>common_vs</a:t>
+            </a:r>
+            <a:r>
+              <a:rPr lang="en-US" dirty="0" smtClean="0"/>
+              <a:t>/</a:t>
+            </a:r>
+            <a:r>
+              <a:rPr lang="en-US" dirty="0" err="1" smtClean="0"/>
+              <a:t>mex_common.props</a:t>
+            </a:r>
+            <a:r>
+              <a:rPr lang="en-US" dirty="0" smtClean="0"/>
+              <a:t>’ to your project</a:t>
+            </a:r>
+            <a:br>
+              <a:rPr lang="en-US" dirty="0" smtClean="0"/>
+            </a:br>
+            <a:r>
+              <a:rPr lang="en-US" dirty="0" smtClean="0"/>
+              <a:t>with these </a:t>
+            </a:r>
+            <a:r>
+              <a:rPr lang="en-US" smtClean="0"/>
+              <a:t>2 steps </a:t>
+            </a:r>
+            <a:r>
+              <a:rPr lang="en-US" dirty="0" smtClean="0"/>
+              <a:t>you </a:t>
+            </a:r>
+            <a:r>
+              <a:rPr lang="en-US" smtClean="0"/>
+              <a:t>ae done!</a:t>
+            </a:r>
+            <a:endParaRPr lang="de-DE" dirty="0"/>
           </a:p>
         </p:txBody>
       </p:sp>

</xml_diff>